<commit_message>
Added more slides about UI design and testing
</commit_message>
<xml_diff>
--- a/scna_2012/scna.pptx
+++ b/scna_2012/scna.pptx
@@ -10,13 +10,16 @@
     <p:sldId id="265" r:id="rId4"/>
     <p:sldId id="256" r:id="rId5"/>
     <p:sldId id="258" r:id="rId6"/>
-    <p:sldId id="266" r:id="rId7"/>
-    <p:sldId id="259" r:id="rId8"/>
-    <p:sldId id="267" r:id="rId9"/>
-    <p:sldId id="260" r:id="rId10"/>
-    <p:sldId id="261" r:id="rId11"/>
-    <p:sldId id="262" r:id="rId12"/>
-    <p:sldId id="268" r:id="rId13"/>
+    <p:sldId id="271" r:id="rId7"/>
+    <p:sldId id="266" r:id="rId8"/>
+    <p:sldId id="259" r:id="rId9"/>
+    <p:sldId id="267" r:id="rId10"/>
+    <p:sldId id="269" r:id="rId11"/>
+    <p:sldId id="270" r:id="rId12"/>
+    <p:sldId id="260" r:id="rId13"/>
+    <p:sldId id="261" r:id="rId14"/>
+    <p:sldId id="262" r:id="rId15"/>
+    <p:sldId id="268" r:id="rId16"/>
   </p:sldIdLst>
   <p:sldSz cx="9144000" cy="6858000" type="screen4x3"/>
   <p:notesSz cx="6858000" cy="9144000"/>
@@ -3784,6 +3787,727 @@
       </p:grpSpPr>
       <p:sp>
         <p:nvSpPr>
+          <p:cNvPr id="3" name="Title 2"/>
+          <p:cNvSpPr>
+            <a:spLocks noGrp="1"/>
+          </p:cNvSpPr>
+          <p:nvPr>
+            <p:ph type="title"/>
+          </p:nvPr>
+        </p:nvSpPr>
+        <p:spPr>
+          <a:xfrm>
+            <a:off x="784720" y="5033722"/>
+            <a:ext cx="7543800" cy="914400"/>
+          </a:xfrm>
+        </p:spPr>
+        <p:txBody>
+          <a:bodyPr/>
+          <a:lstStyle/>
+          <a:p>
+            <a:r>
+              <a:rPr lang="en-US" dirty="0" smtClean="0"/>
+              <a:t>Tests can be expensive</a:t>
+            </a:r>
+            <a:endParaRPr lang="en-US" dirty="0"/>
+          </a:p>
+        </p:txBody>
+      </p:sp>
+      <p:grpSp>
+        <p:nvGrpSpPr>
+          <p:cNvPr id="5" name="Group 4"/>
+          <p:cNvGrpSpPr/>
+          <p:nvPr/>
+        </p:nvGrpSpPr>
+        <p:grpSpPr>
+          <a:xfrm>
+            <a:off x="2270620" y="304800"/>
+            <a:ext cx="4572000" cy="4726126"/>
+            <a:chOff x="2270620" y="304800"/>
+            <a:chExt cx="4572000" cy="4726126"/>
+          </a:xfrm>
+        </p:grpSpPr>
+        <p:sp>
+          <p:nvSpPr>
+            <p:cNvPr id="4" name="Rectangle 3"/>
+            <p:cNvSpPr/>
+            <p:nvPr/>
+          </p:nvSpPr>
+          <p:spPr>
+            <a:xfrm>
+              <a:off x="2270620" y="3276600"/>
+              <a:ext cx="4572000" cy="1754326"/>
+            </a:xfrm>
+            <a:prstGeom prst="rect">
+              <a:avLst/>
+            </a:prstGeom>
+          </p:spPr>
+          <p:txBody>
+            <a:bodyPr>
+              <a:spAutoFit/>
+            </a:bodyPr>
+            <a:lstStyle/>
+            <a:p>
+              <a:pPr marL="285750" indent="-285750">
+                <a:buFont typeface="Arial" pitchFamily="34" charset="0"/>
+                <a:buChar char="•"/>
+              </a:pPr>
+              <a:r>
+                <a:rPr lang="en-US" dirty="0"/>
+                <a:t>Set a build budget. Which tests are most </a:t>
+              </a:r>
+              <a:r>
+                <a:rPr lang="en-US" dirty="0" smtClean="0"/>
+                <a:t>valuable.</a:t>
+              </a:r>
+            </a:p>
+            <a:p>
+              <a:pPr marL="285750" indent="-285750">
+                <a:buFont typeface="Arial" pitchFamily="34" charset="0"/>
+                <a:buChar char="•"/>
+              </a:pPr>
+              <a:endParaRPr lang="en-US" dirty="0"/>
+            </a:p>
+            <a:p>
+              <a:pPr marL="285750" indent="-285750">
+                <a:buFont typeface="Arial" pitchFamily="34" charset="0"/>
+                <a:buChar char="•"/>
+              </a:pPr>
+              <a:r>
+                <a:rPr lang="en-US" dirty="0" smtClean="0"/>
+                <a:t>Delete </a:t>
+              </a:r>
+              <a:r>
+                <a:rPr lang="en-US" dirty="0"/>
+                <a:t>tests that take too long. Over time bad tests take longer </a:t>
+              </a:r>
+              <a:r>
+                <a:rPr lang="en-US" dirty="0" smtClean="0"/>
+                <a:t>to</a:t>
+              </a:r>
+              <a:r>
+                <a:rPr lang="en-US" dirty="0"/>
+                <a:t/>
+              </a:r>
+              <a:br>
+                <a:rPr lang="en-US" dirty="0"/>
+              </a:br>
+              <a:r>
+                <a:rPr lang="en-US" dirty="0"/>
+                <a:t>run and </a:t>
+              </a:r>
+              <a:r>
+                <a:rPr lang="en-US" dirty="0" smtClean="0"/>
+                <a:t>maintain</a:t>
+              </a:r>
+            </a:p>
+          </p:txBody>
+        </p:sp>
+        <p:pic>
+          <p:nvPicPr>
+            <p:cNvPr id="2050" name="Picture 2" descr="http://webmoneymaker.net/wp-content/uploads/2011/11/Make-Money-online.jpg"/>
+            <p:cNvPicPr>
+              <a:picLocks noChangeAspect="1" noChangeArrowheads="1"/>
+            </p:cNvPicPr>
+            <p:nvPr/>
+          </p:nvPicPr>
+          <p:blipFill>
+            <a:blip r:embed="rId2">
+              <a:extLst>
+                <a:ext uri="{28A0092B-C50C-407E-A947-70E740481C1C}">
+                  <a14:useLocalDpi xmlns:a14="http://schemas.microsoft.com/office/drawing/2010/main" val="0"/>
+                </a:ext>
+              </a:extLst>
+            </a:blip>
+            <a:srcRect/>
+            <a:stretch>
+              <a:fillRect/>
+            </a:stretch>
+          </p:blipFill>
+          <p:spPr bwMode="auto">
+            <a:xfrm>
+              <a:off x="2514600" y="304800"/>
+              <a:ext cx="3886200" cy="2590800"/>
+            </a:xfrm>
+            <a:prstGeom prst="rect">
+              <a:avLst/>
+            </a:prstGeom>
+            <a:noFill/>
+            <a:extLst>
+              <a:ext uri="{909E8E84-426E-40DD-AFC4-6F175D3DCCD1}">
+                <a14:hiddenFill xmlns:a14="http://schemas.microsoft.com/office/drawing/2010/main">
+                  <a:solidFill>
+                    <a:srgbClr val="FFFFFF"/>
+                  </a:solidFill>
+                </a14:hiddenFill>
+              </a:ext>
+            </a:extLst>
+          </p:spPr>
+        </p:pic>
+      </p:grpSp>
+    </p:spTree>
+    <p:extLst>
+      <p:ext uri="{BB962C8B-B14F-4D97-AF65-F5344CB8AC3E}">
+        <p14:creationId xmlns:p14="http://schemas.microsoft.com/office/powerpoint/2010/main" val="3037401815"/>
+      </p:ext>
+    </p:extLst>
+  </p:cSld>
+  <p:clrMapOvr>
+    <a:masterClrMapping/>
+  </p:clrMapOvr>
+  <p:timing>
+    <p:tnLst>
+      <p:par>
+        <p:cTn id="1" dur="indefinite" restart="never" nodeType="tmRoot">
+          <p:childTnLst>
+            <p:seq concurrent="1" nextAc="seek">
+              <p:cTn id="2" dur="indefinite" nodeType="mainSeq">
+                <p:childTnLst>
+                  <p:par>
+                    <p:cTn id="3" fill="hold">
+                      <p:stCondLst>
+                        <p:cond delay="indefinite"/>
+                      </p:stCondLst>
+                      <p:childTnLst>
+                        <p:par>
+                          <p:cTn id="4" fill="hold">
+                            <p:stCondLst>
+                              <p:cond delay="0"/>
+                            </p:stCondLst>
+                            <p:childTnLst>
+                              <p:par>
+                                <p:cTn id="5" presetID="42" presetClass="entr" presetSubtype="0" fill="hold" nodeType="clickEffect">
+                                  <p:stCondLst>
+                                    <p:cond delay="0"/>
+                                  </p:stCondLst>
+                                  <p:childTnLst>
+                                    <p:set>
+                                      <p:cBhvr>
+                                        <p:cTn id="6" dur="1" fill="hold">
+                                          <p:stCondLst>
+                                            <p:cond delay="0"/>
+                                          </p:stCondLst>
+                                        </p:cTn>
+                                        <p:tgtEl>
+                                          <p:spTgt spid="5"/>
+                                        </p:tgtEl>
+                                        <p:attrNameLst>
+                                          <p:attrName>style.visibility</p:attrName>
+                                        </p:attrNameLst>
+                                      </p:cBhvr>
+                                      <p:to>
+                                        <p:strVal val="visible"/>
+                                      </p:to>
+                                    </p:set>
+                                    <p:animEffect transition="in" filter="fade">
+                                      <p:cBhvr>
+                                        <p:cTn id="7" dur="1000"/>
+                                        <p:tgtEl>
+                                          <p:spTgt spid="5"/>
+                                        </p:tgtEl>
+                                      </p:cBhvr>
+                                    </p:animEffect>
+                                    <p:anim calcmode="lin" valueType="num">
+                                      <p:cBhvr>
+                                        <p:cTn id="8" dur="1000" fill="hold"/>
+                                        <p:tgtEl>
+                                          <p:spTgt spid="5"/>
+                                        </p:tgtEl>
+                                        <p:attrNameLst>
+                                          <p:attrName>ppt_x</p:attrName>
+                                        </p:attrNameLst>
+                                      </p:cBhvr>
+                                      <p:tavLst>
+                                        <p:tav tm="0">
+                                          <p:val>
+                                            <p:strVal val="#ppt_x"/>
+                                          </p:val>
+                                        </p:tav>
+                                        <p:tav tm="100000">
+                                          <p:val>
+                                            <p:strVal val="#ppt_x"/>
+                                          </p:val>
+                                        </p:tav>
+                                      </p:tavLst>
+                                    </p:anim>
+                                    <p:anim calcmode="lin" valueType="num">
+                                      <p:cBhvr>
+                                        <p:cTn id="9" dur="1000" fill="hold"/>
+                                        <p:tgtEl>
+                                          <p:spTgt spid="5"/>
+                                        </p:tgtEl>
+                                        <p:attrNameLst>
+                                          <p:attrName>ppt_y</p:attrName>
+                                        </p:attrNameLst>
+                                      </p:cBhvr>
+                                      <p:tavLst>
+                                        <p:tav tm="0">
+                                          <p:val>
+                                            <p:strVal val="#ppt_y+.1"/>
+                                          </p:val>
+                                        </p:tav>
+                                        <p:tav tm="100000">
+                                          <p:val>
+                                            <p:strVal val="#ppt_y"/>
+                                          </p:val>
+                                        </p:tav>
+                                      </p:tavLst>
+                                    </p:anim>
+                                  </p:childTnLst>
+                                </p:cTn>
+                              </p:par>
+                            </p:childTnLst>
+                          </p:cTn>
+                        </p:par>
+                      </p:childTnLst>
+                    </p:cTn>
+                  </p:par>
+                </p:childTnLst>
+              </p:cTn>
+              <p:prevCondLst>
+                <p:cond evt="onPrev" delay="0">
+                  <p:tgtEl>
+                    <p:sldTgt/>
+                  </p:tgtEl>
+                </p:cond>
+              </p:prevCondLst>
+              <p:nextCondLst>
+                <p:cond evt="onNext" delay="0">
+                  <p:tgtEl>
+                    <p:sldTgt/>
+                  </p:tgtEl>
+                </p:cond>
+              </p:nextCondLst>
+            </p:seq>
+          </p:childTnLst>
+        </p:cTn>
+      </p:par>
+    </p:tnLst>
+  </p:timing>
+</p:sld>
+</file>
+
+<file path=ppt/slides/slide11.xml><?xml version="1.0" encoding="utf-8"?>
+<p:sld xmlns:a="http://schemas.openxmlformats.org/drawingml/2006/main" xmlns:r="http://schemas.openxmlformats.org/officeDocument/2006/relationships" xmlns:p="http://schemas.openxmlformats.org/presentationml/2006/main">
+  <p:cSld>
+    <p:spTree>
+      <p:nvGrpSpPr>
+        <p:cNvPr id="1" name=""/>
+        <p:cNvGrpSpPr/>
+        <p:nvPr/>
+      </p:nvGrpSpPr>
+      <p:grpSpPr>
+        <a:xfrm>
+          <a:off x="0" y="0"/>
+          <a:ext cx="0" cy="0"/>
+          <a:chOff x="0" y="0"/>
+          <a:chExt cx="0" cy="0"/>
+        </a:xfrm>
+      </p:grpSpPr>
+      <p:sp>
+        <p:nvSpPr>
+          <p:cNvPr id="3" name="Title 2"/>
+          <p:cNvSpPr>
+            <a:spLocks noGrp="1"/>
+          </p:cNvSpPr>
+          <p:nvPr>
+            <p:ph type="title"/>
+          </p:nvPr>
+        </p:nvSpPr>
+        <p:spPr/>
+        <p:txBody>
+          <a:bodyPr/>
+          <a:lstStyle/>
+          <a:p>
+            <a:r>
+              <a:rPr lang="en-US" dirty="0" smtClean="0"/>
+              <a:t>Focus tests</a:t>
+            </a:r>
+            <a:endParaRPr lang="en-US" dirty="0"/>
+          </a:p>
+        </p:txBody>
+      </p:sp>
+      <p:grpSp>
+        <p:nvGrpSpPr>
+          <p:cNvPr id="6" name="Group 5"/>
+          <p:cNvGrpSpPr/>
+          <p:nvPr/>
+        </p:nvGrpSpPr>
+        <p:grpSpPr>
+          <a:xfrm>
+            <a:off x="2286000" y="838200"/>
+            <a:ext cx="4572000" cy="3839528"/>
+            <a:chOff x="2286000" y="838200"/>
+            <a:chExt cx="4572000" cy="3839528"/>
+          </a:xfrm>
+        </p:grpSpPr>
+        <p:sp>
+          <p:nvSpPr>
+            <p:cNvPr id="5" name="Rectangle 4"/>
+            <p:cNvSpPr/>
+            <p:nvPr/>
+          </p:nvSpPr>
+          <p:spPr>
+            <a:xfrm>
+              <a:off x="2286000" y="3200400"/>
+              <a:ext cx="4572000" cy="1477328"/>
+            </a:xfrm>
+            <a:prstGeom prst="rect">
+              <a:avLst/>
+            </a:prstGeom>
+          </p:spPr>
+          <p:txBody>
+            <a:bodyPr>
+              <a:spAutoFit/>
+            </a:bodyPr>
+            <a:lstStyle/>
+            <a:p>
+              <a:pPr marL="285750" indent="-285750">
+                <a:buFont typeface="Arial" pitchFamily="34" charset="0"/>
+                <a:buChar char="•"/>
+              </a:pPr>
+              <a:r>
+                <a:rPr lang="en-US" dirty="0" smtClean="0"/>
+                <a:t>Confidence </a:t>
+              </a:r>
+              <a:r>
+                <a:rPr lang="en-US" dirty="0"/>
+                <a:t>that if its green your app </a:t>
+              </a:r>
+              <a:r>
+                <a:rPr lang="en-US" dirty="0" smtClean="0"/>
+                <a:t>works</a:t>
+              </a:r>
+            </a:p>
+            <a:p>
+              <a:pPr marL="285750" indent="-285750">
+                <a:buFont typeface="Arial" pitchFamily="34" charset="0"/>
+                <a:buChar char="•"/>
+              </a:pPr>
+              <a:endParaRPr lang="en-US" dirty="0"/>
+            </a:p>
+            <a:p>
+              <a:pPr marL="285750" indent="-285750">
+                <a:buFont typeface="Arial" pitchFamily="34" charset="0"/>
+                <a:buChar char="•"/>
+              </a:pPr>
+              <a:r>
+                <a:rPr lang="en-US" dirty="0"/>
+                <a:t>Has the test ever failed? Might be good candidate to be removed.</a:t>
+              </a:r>
+              <a:endParaRPr lang="en-US" dirty="0"/>
+            </a:p>
+          </p:txBody>
+        </p:sp>
+        <p:pic>
+          <p:nvPicPr>
+            <p:cNvPr id="3074" name="Picture 2" descr="http://academysuccess.com/wp-content/uploads/2012/07/focus.jpg"/>
+            <p:cNvPicPr>
+              <a:picLocks noChangeAspect="1" noChangeArrowheads="1"/>
+            </p:cNvPicPr>
+            <p:nvPr/>
+          </p:nvPicPr>
+          <p:blipFill>
+            <a:blip r:embed="rId2">
+              <a:extLst>
+                <a:ext uri="{28A0092B-C50C-407E-A947-70E740481C1C}">
+                  <a14:useLocalDpi xmlns:a14="http://schemas.microsoft.com/office/drawing/2010/main" val="0"/>
+                </a:ext>
+              </a:extLst>
+            </a:blip>
+            <a:srcRect/>
+            <a:stretch>
+              <a:fillRect/>
+            </a:stretch>
+          </p:blipFill>
+          <p:spPr bwMode="auto">
+            <a:xfrm>
+              <a:off x="3249179" y="838200"/>
+              <a:ext cx="2645641" cy="2087577"/>
+            </a:xfrm>
+            <a:prstGeom prst="rect">
+              <a:avLst/>
+            </a:prstGeom>
+            <a:noFill/>
+            <a:extLst>
+              <a:ext uri="{909E8E84-426E-40DD-AFC4-6F175D3DCCD1}">
+                <a14:hiddenFill xmlns:a14="http://schemas.microsoft.com/office/drawing/2010/main">
+                  <a:solidFill>
+                    <a:srgbClr val="FFFFFF"/>
+                  </a:solidFill>
+                </a14:hiddenFill>
+              </a:ext>
+            </a:extLst>
+          </p:spPr>
+        </p:pic>
+      </p:grpSp>
+    </p:spTree>
+    <p:extLst>
+      <p:ext uri="{BB962C8B-B14F-4D97-AF65-F5344CB8AC3E}">
+        <p14:creationId xmlns:p14="http://schemas.microsoft.com/office/powerpoint/2010/main" val="365876312"/>
+      </p:ext>
+    </p:extLst>
+  </p:cSld>
+  <p:clrMapOvr>
+    <a:masterClrMapping/>
+  </p:clrMapOvr>
+  <p:timing>
+    <p:tnLst>
+      <p:par>
+        <p:cTn id="1" dur="indefinite" restart="never" nodeType="tmRoot">
+          <p:childTnLst>
+            <p:seq concurrent="1" nextAc="seek">
+              <p:cTn id="2" dur="indefinite" nodeType="mainSeq">
+                <p:childTnLst>
+                  <p:par>
+                    <p:cTn id="3" fill="hold">
+                      <p:stCondLst>
+                        <p:cond delay="indefinite"/>
+                      </p:stCondLst>
+                      <p:childTnLst>
+                        <p:par>
+                          <p:cTn id="4" fill="hold">
+                            <p:stCondLst>
+                              <p:cond delay="0"/>
+                            </p:stCondLst>
+                            <p:childTnLst>
+                              <p:par>
+                                <p:cTn id="5" presetID="42" presetClass="entr" presetSubtype="0" fill="hold" nodeType="clickEffect">
+                                  <p:stCondLst>
+                                    <p:cond delay="0"/>
+                                  </p:stCondLst>
+                                  <p:childTnLst>
+                                    <p:set>
+                                      <p:cBhvr>
+                                        <p:cTn id="6" dur="1" fill="hold">
+                                          <p:stCondLst>
+                                            <p:cond delay="0"/>
+                                          </p:stCondLst>
+                                        </p:cTn>
+                                        <p:tgtEl>
+                                          <p:spTgt spid="6"/>
+                                        </p:tgtEl>
+                                        <p:attrNameLst>
+                                          <p:attrName>style.visibility</p:attrName>
+                                        </p:attrNameLst>
+                                      </p:cBhvr>
+                                      <p:to>
+                                        <p:strVal val="visible"/>
+                                      </p:to>
+                                    </p:set>
+                                    <p:animEffect transition="in" filter="fade">
+                                      <p:cBhvr>
+                                        <p:cTn id="7" dur="1000"/>
+                                        <p:tgtEl>
+                                          <p:spTgt spid="6"/>
+                                        </p:tgtEl>
+                                      </p:cBhvr>
+                                    </p:animEffect>
+                                    <p:anim calcmode="lin" valueType="num">
+                                      <p:cBhvr>
+                                        <p:cTn id="8" dur="1000" fill="hold"/>
+                                        <p:tgtEl>
+                                          <p:spTgt spid="6"/>
+                                        </p:tgtEl>
+                                        <p:attrNameLst>
+                                          <p:attrName>ppt_x</p:attrName>
+                                        </p:attrNameLst>
+                                      </p:cBhvr>
+                                      <p:tavLst>
+                                        <p:tav tm="0">
+                                          <p:val>
+                                            <p:strVal val="#ppt_x"/>
+                                          </p:val>
+                                        </p:tav>
+                                        <p:tav tm="100000">
+                                          <p:val>
+                                            <p:strVal val="#ppt_x"/>
+                                          </p:val>
+                                        </p:tav>
+                                      </p:tavLst>
+                                    </p:anim>
+                                    <p:anim calcmode="lin" valueType="num">
+                                      <p:cBhvr>
+                                        <p:cTn id="9" dur="1000" fill="hold"/>
+                                        <p:tgtEl>
+                                          <p:spTgt spid="6"/>
+                                        </p:tgtEl>
+                                        <p:attrNameLst>
+                                          <p:attrName>ppt_y</p:attrName>
+                                        </p:attrNameLst>
+                                      </p:cBhvr>
+                                      <p:tavLst>
+                                        <p:tav tm="0">
+                                          <p:val>
+                                            <p:strVal val="#ppt_y+.1"/>
+                                          </p:val>
+                                        </p:tav>
+                                        <p:tav tm="100000">
+                                          <p:val>
+                                            <p:strVal val="#ppt_y"/>
+                                          </p:val>
+                                        </p:tav>
+                                      </p:tavLst>
+                                    </p:anim>
+                                  </p:childTnLst>
+                                </p:cTn>
+                              </p:par>
+                            </p:childTnLst>
+                          </p:cTn>
+                        </p:par>
+                      </p:childTnLst>
+                    </p:cTn>
+                  </p:par>
+                </p:childTnLst>
+              </p:cTn>
+              <p:prevCondLst>
+                <p:cond evt="onPrev" delay="0">
+                  <p:tgtEl>
+                    <p:sldTgt/>
+                  </p:tgtEl>
+                </p:cond>
+              </p:prevCondLst>
+              <p:nextCondLst>
+                <p:cond evt="onNext" delay="0">
+                  <p:tgtEl>
+                    <p:sldTgt/>
+                  </p:tgtEl>
+                </p:cond>
+              </p:nextCondLst>
+            </p:seq>
+          </p:childTnLst>
+        </p:cTn>
+      </p:par>
+    </p:tnLst>
+  </p:timing>
+</p:sld>
+</file>
+
+<file path=ppt/slides/slide12.xml><?xml version="1.0" encoding="utf-8"?>
+<p:sld xmlns:a="http://schemas.openxmlformats.org/drawingml/2006/main" xmlns:r="http://schemas.openxmlformats.org/officeDocument/2006/relationships" xmlns:p="http://schemas.openxmlformats.org/presentationml/2006/main">
+  <p:cSld>
+    <p:spTree>
+      <p:nvGrpSpPr>
+        <p:cNvPr id="1" name=""/>
+        <p:cNvGrpSpPr/>
+        <p:nvPr/>
+      </p:nvGrpSpPr>
+      <p:grpSpPr>
+        <a:xfrm>
+          <a:off x="0" y="0"/>
+          <a:ext cx="0" cy="0"/>
+          <a:chOff x="0" y="0"/>
+          <a:chExt cx="0" cy="0"/>
+        </a:xfrm>
+      </p:grpSpPr>
+      <p:sp>
+        <p:nvSpPr>
+          <p:cNvPr id="4" name="Rectangle 3"/>
+          <p:cNvSpPr/>
+          <p:nvPr/>
+        </p:nvSpPr>
+        <p:spPr>
+          <a:xfrm>
+            <a:off x="3372424" y="838200"/>
+            <a:ext cx="2350323" cy="369332"/>
+          </a:xfrm>
+          <a:prstGeom prst="rect">
+            <a:avLst/>
+          </a:prstGeom>
+        </p:spPr>
+        <p:txBody>
+          <a:bodyPr wrap="none">
+            <a:spAutoFit/>
+          </a:bodyPr>
+          <a:lstStyle/>
+          <a:p>
+            <a:r>
+              <a:rPr lang="en-US" dirty="0"/>
+              <a:t>Refactor with respect</a:t>
+            </a:r>
+          </a:p>
+        </p:txBody>
+      </p:sp>
+      <p:pic>
+        <p:nvPicPr>
+          <p:cNvPr id="5122" name="Picture 2" descr="https://encrypted-tbn0.gstatic.com/images?q=tbn:ANd9GcQBimM8hQVe9QrZBuGyMOIzujUOZbTVyDFwASlm16FudOfiQ4g7SA"/>
+          <p:cNvPicPr>
+            <a:picLocks noChangeAspect="1" noChangeArrowheads="1"/>
+          </p:cNvPicPr>
+          <p:nvPr/>
+        </p:nvPicPr>
+        <p:blipFill>
+          <a:blip r:embed="rId2">
+            <a:extLst>
+              <a:ext uri="{28A0092B-C50C-407E-A947-70E740481C1C}">
+                <a14:useLocalDpi xmlns:a14="http://schemas.microsoft.com/office/drawing/2010/main" val="0"/>
+              </a:ext>
+            </a:extLst>
+          </a:blip>
+          <a:srcRect/>
+          <a:stretch>
+            <a:fillRect/>
+          </a:stretch>
+        </p:blipFill>
+        <p:spPr bwMode="auto">
+          <a:xfrm>
+            <a:off x="3048000" y="1752600"/>
+            <a:ext cx="3173603" cy="2980429"/>
+          </a:xfrm>
+          <a:prstGeom prst="rect">
+            <a:avLst/>
+          </a:prstGeom>
+          <a:noFill/>
+          <a:extLst>
+            <a:ext uri="{909E8E84-426E-40DD-AFC4-6F175D3DCCD1}">
+              <a14:hiddenFill xmlns:a14="http://schemas.microsoft.com/office/drawing/2010/main">
+                <a:solidFill>
+                  <a:srgbClr val="FFFFFF"/>
+                </a:solidFill>
+              </a14:hiddenFill>
+            </a:ext>
+          </a:extLst>
+        </p:spPr>
+      </p:pic>
+    </p:spTree>
+    <p:extLst>
+      <p:ext uri="{BB962C8B-B14F-4D97-AF65-F5344CB8AC3E}">
+        <p14:creationId xmlns:p14="http://schemas.microsoft.com/office/powerpoint/2010/main" val="901413111"/>
+      </p:ext>
+    </p:extLst>
+  </p:cSld>
+  <p:clrMapOvr>
+    <a:masterClrMapping/>
+  </p:clrMapOvr>
+  <p:timing>
+    <p:tnLst>
+      <p:par>
+        <p:cTn id="1" dur="indefinite" restart="never" nodeType="tmRoot"/>
+      </p:par>
+    </p:tnLst>
+  </p:timing>
+</p:sld>
+</file>
+
+<file path=ppt/slides/slide13.xml><?xml version="1.0" encoding="utf-8"?>
+<p:sld xmlns:a="http://schemas.openxmlformats.org/drawingml/2006/main" xmlns:r="http://schemas.openxmlformats.org/officeDocument/2006/relationships" xmlns:p="http://schemas.openxmlformats.org/presentationml/2006/main">
+  <p:cSld>
+    <p:spTree>
+      <p:nvGrpSpPr>
+        <p:cNvPr id="1" name=""/>
+        <p:cNvGrpSpPr/>
+        <p:nvPr/>
+      </p:nvGrpSpPr>
+      <p:grpSpPr>
+        <a:xfrm>
+          <a:off x="0" y="0"/>
+          <a:ext cx="0" cy="0"/>
+          <a:chOff x="0" y="0"/>
+          <a:chExt cx="0" cy="0"/>
+        </a:xfrm>
+      </p:grpSpPr>
+      <p:sp>
+        <p:nvSpPr>
           <p:cNvPr id="4" name="Rectangle 3"/>
           <p:cNvSpPr/>
           <p:nvPr/>
@@ -3871,7 +4595,7 @@
 </p:sld>
 </file>
 
-<file path=ppt/slides/slide11.xml><?xml version="1.0" encoding="utf-8"?>
+<file path=ppt/slides/slide14.xml><?xml version="1.0" encoding="utf-8"?>
 <p:sld xmlns:a="http://schemas.openxmlformats.org/drawingml/2006/main" xmlns:r="http://schemas.openxmlformats.org/officeDocument/2006/relationships" xmlns:p="http://schemas.openxmlformats.org/presentationml/2006/main">
   <p:cSld>
     <p:spTree>
@@ -4048,7 +4772,7 @@
 </p:sld>
 </file>
 
-<file path=ppt/slides/slide12.xml><?xml version="1.0" encoding="utf-8"?>
+<file path=ppt/slides/slide15.xml><?xml version="1.0" encoding="utf-8"?>
 <p:sld xmlns:a="http://schemas.openxmlformats.org/drawingml/2006/main" xmlns:r="http://schemas.openxmlformats.org/officeDocument/2006/relationships" xmlns:p="http://schemas.openxmlformats.org/presentationml/2006/main">
   <p:cSld>
     <p:spTree>
@@ -4946,6 +5670,310 @@
           <a:chExt cx="0" cy="0"/>
         </a:xfrm>
       </p:grpSpPr>
+      <p:sp>
+        <p:nvSpPr>
+          <p:cNvPr id="3" name="Title 2"/>
+          <p:cNvSpPr>
+            <a:spLocks noGrp="1"/>
+          </p:cNvSpPr>
+          <p:nvPr>
+            <p:ph type="title"/>
+          </p:nvPr>
+        </p:nvSpPr>
+        <p:spPr/>
+        <p:txBody>
+          <a:bodyPr/>
+          <a:lstStyle/>
+          <a:p>
+            <a:r>
+              <a:rPr lang="en-US" dirty="0" smtClean="0"/>
+              <a:t>UI design is important too</a:t>
+            </a:r>
+            <a:endParaRPr lang="en-US" dirty="0"/>
+          </a:p>
+        </p:txBody>
+      </p:sp>
+      <p:grpSp>
+        <p:nvGrpSpPr>
+          <p:cNvPr id="5" name="Group 4"/>
+          <p:cNvGrpSpPr/>
+          <p:nvPr/>
+        </p:nvGrpSpPr>
+        <p:grpSpPr>
+          <a:xfrm>
+            <a:off x="2302079" y="708418"/>
+            <a:ext cx="5927521" cy="3643912"/>
+            <a:chOff x="2302079" y="708418"/>
+            <a:chExt cx="5927521" cy="3643912"/>
+          </a:xfrm>
+        </p:grpSpPr>
+        <p:sp>
+          <p:nvSpPr>
+            <p:cNvPr id="4" name="Rectangle 3"/>
+            <p:cNvSpPr/>
+            <p:nvPr/>
+          </p:nvSpPr>
+          <p:spPr>
+            <a:xfrm>
+              <a:off x="2302079" y="3429000"/>
+              <a:ext cx="4572000" cy="923330"/>
+            </a:xfrm>
+            <a:prstGeom prst="rect">
+              <a:avLst/>
+            </a:prstGeom>
+          </p:spPr>
+          <p:txBody>
+            <a:bodyPr>
+              <a:spAutoFit/>
+            </a:bodyPr>
+            <a:lstStyle/>
+            <a:p>
+              <a:pPr marL="285750" indent="-285750">
+                <a:buFont typeface="Arial" pitchFamily="34" charset="0"/>
+                <a:buChar char="•"/>
+              </a:pPr>
+              <a:r>
+                <a:rPr lang="en-US" dirty="0" smtClean="0"/>
+                <a:t>Flow</a:t>
+              </a:r>
+            </a:p>
+            <a:p>
+              <a:pPr marL="285750" indent="-285750">
+                <a:buFont typeface="Arial" pitchFamily="34" charset="0"/>
+                <a:buChar char="•"/>
+              </a:pPr>
+              <a:endParaRPr lang="en-US" dirty="0"/>
+            </a:p>
+            <a:p>
+              <a:pPr marL="285750" indent="-285750">
+                <a:buFont typeface="Arial" pitchFamily="34" charset="0"/>
+                <a:buChar char="•"/>
+              </a:pPr>
+              <a:r>
+                <a:rPr lang="en-US" dirty="0" smtClean="0"/>
+                <a:t>Let’s </a:t>
+              </a:r>
+              <a:r>
+                <a:rPr lang="en-US" dirty="0"/>
+                <a:t>t</a:t>
+              </a:r>
+              <a:r>
+                <a:rPr lang="en-US" dirty="0" smtClean="0"/>
+                <a:t>rack </a:t>
+              </a:r>
+              <a:r>
+                <a:rPr lang="en-US" dirty="0"/>
+                <a:t>UI </a:t>
+              </a:r>
+              <a:r>
+                <a:rPr lang="en-US" dirty="0" smtClean="0"/>
+                <a:t>usage</a:t>
+              </a:r>
+              <a:endParaRPr lang="en-US" dirty="0"/>
+            </a:p>
+          </p:txBody>
+        </p:sp>
+        <p:pic>
+          <p:nvPicPr>
+            <p:cNvPr id="1026" name="Picture 2" descr="http://localoaf.org/wp-content/uploads/2006/12/wgetgui-screenshot.png"/>
+            <p:cNvPicPr>
+              <a:picLocks noChangeAspect="1" noChangeArrowheads="1"/>
+            </p:cNvPicPr>
+            <p:nvPr/>
+          </p:nvPicPr>
+          <p:blipFill>
+            <a:blip r:embed="rId2">
+              <a:extLst>
+                <a:ext uri="{28A0092B-C50C-407E-A947-70E740481C1C}">
+                  <a14:useLocalDpi xmlns:a14="http://schemas.microsoft.com/office/drawing/2010/main" val="0"/>
+                </a:ext>
+              </a:extLst>
+            </a:blip>
+            <a:srcRect/>
+            <a:stretch>
+              <a:fillRect/>
+            </a:stretch>
+          </p:blipFill>
+          <p:spPr bwMode="auto">
+            <a:xfrm>
+              <a:off x="3657600" y="708418"/>
+              <a:ext cx="4572000" cy="3173159"/>
+            </a:xfrm>
+            <a:prstGeom prst="rect">
+              <a:avLst/>
+            </a:prstGeom>
+            <a:noFill/>
+            <a:extLst>
+              <a:ext uri="{909E8E84-426E-40DD-AFC4-6F175D3DCCD1}">
+                <a14:hiddenFill xmlns:a14="http://schemas.microsoft.com/office/drawing/2010/main">
+                  <a:solidFill>
+                    <a:srgbClr val="FFFFFF"/>
+                  </a:solidFill>
+                </a14:hiddenFill>
+              </a:ext>
+            </a:extLst>
+          </p:spPr>
+        </p:pic>
+      </p:grpSp>
+    </p:spTree>
+    <p:extLst>
+      <p:ext uri="{BB962C8B-B14F-4D97-AF65-F5344CB8AC3E}">
+        <p14:creationId xmlns:p14="http://schemas.microsoft.com/office/powerpoint/2010/main" val="4041452383"/>
+      </p:ext>
+    </p:extLst>
+  </p:cSld>
+  <p:clrMapOvr>
+    <a:masterClrMapping/>
+  </p:clrMapOvr>
+  <p:timing>
+    <p:tnLst>
+      <p:par>
+        <p:cTn id="1" dur="indefinite" restart="never" nodeType="tmRoot">
+          <p:childTnLst>
+            <p:seq concurrent="1" nextAc="seek">
+              <p:cTn id="2" dur="indefinite" nodeType="mainSeq">
+                <p:childTnLst>
+                  <p:par>
+                    <p:cTn id="3" fill="hold">
+                      <p:stCondLst>
+                        <p:cond delay="indefinite"/>
+                      </p:stCondLst>
+                      <p:childTnLst>
+                        <p:par>
+                          <p:cTn id="4" fill="hold">
+                            <p:stCondLst>
+                              <p:cond delay="0"/>
+                            </p:stCondLst>
+                            <p:childTnLst>
+                              <p:par>
+                                <p:cTn id="5" presetID="42" presetClass="entr" presetSubtype="0" fill="hold" nodeType="clickEffect">
+                                  <p:stCondLst>
+                                    <p:cond delay="0"/>
+                                  </p:stCondLst>
+                                  <p:childTnLst>
+                                    <p:set>
+                                      <p:cBhvr>
+                                        <p:cTn id="6" dur="1" fill="hold">
+                                          <p:stCondLst>
+                                            <p:cond delay="0"/>
+                                          </p:stCondLst>
+                                        </p:cTn>
+                                        <p:tgtEl>
+                                          <p:spTgt spid="5"/>
+                                        </p:tgtEl>
+                                        <p:attrNameLst>
+                                          <p:attrName>style.visibility</p:attrName>
+                                        </p:attrNameLst>
+                                      </p:cBhvr>
+                                      <p:to>
+                                        <p:strVal val="visible"/>
+                                      </p:to>
+                                    </p:set>
+                                    <p:animEffect transition="in" filter="fade">
+                                      <p:cBhvr>
+                                        <p:cTn id="7" dur="1000"/>
+                                        <p:tgtEl>
+                                          <p:spTgt spid="5"/>
+                                        </p:tgtEl>
+                                      </p:cBhvr>
+                                    </p:animEffect>
+                                    <p:anim calcmode="lin" valueType="num">
+                                      <p:cBhvr>
+                                        <p:cTn id="8" dur="1000" fill="hold"/>
+                                        <p:tgtEl>
+                                          <p:spTgt spid="5"/>
+                                        </p:tgtEl>
+                                        <p:attrNameLst>
+                                          <p:attrName>ppt_x</p:attrName>
+                                        </p:attrNameLst>
+                                      </p:cBhvr>
+                                      <p:tavLst>
+                                        <p:tav tm="0">
+                                          <p:val>
+                                            <p:strVal val="#ppt_x"/>
+                                          </p:val>
+                                        </p:tav>
+                                        <p:tav tm="100000">
+                                          <p:val>
+                                            <p:strVal val="#ppt_x"/>
+                                          </p:val>
+                                        </p:tav>
+                                      </p:tavLst>
+                                    </p:anim>
+                                    <p:anim calcmode="lin" valueType="num">
+                                      <p:cBhvr>
+                                        <p:cTn id="9" dur="1000" fill="hold"/>
+                                        <p:tgtEl>
+                                          <p:spTgt spid="5"/>
+                                        </p:tgtEl>
+                                        <p:attrNameLst>
+                                          <p:attrName>ppt_y</p:attrName>
+                                        </p:attrNameLst>
+                                      </p:cBhvr>
+                                      <p:tavLst>
+                                        <p:tav tm="0">
+                                          <p:val>
+                                            <p:strVal val="#ppt_y+.1"/>
+                                          </p:val>
+                                        </p:tav>
+                                        <p:tav tm="100000">
+                                          <p:val>
+                                            <p:strVal val="#ppt_y"/>
+                                          </p:val>
+                                        </p:tav>
+                                      </p:tavLst>
+                                    </p:anim>
+                                  </p:childTnLst>
+                                </p:cTn>
+                              </p:par>
+                            </p:childTnLst>
+                          </p:cTn>
+                        </p:par>
+                      </p:childTnLst>
+                    </p:cTn>
+                  </p:par>
+                </p:childTnLst>
+              </p:cTn>
+              <p:prevCondLst>
+                <p:cond evt="onPrev" delay="0">
+                  <p:tgtEl>
+                    <p:sldTgt/>
+                  </p:tgtEl>
+                </p:cond>
+              </p:prevCondLst>
+              <p:nextCondLst>
+                <p:cond evt="onNext" delay="0">
+                  <p:tgtEl>
+                    <p:sldTgt/>
+                  </p:tgtEl>
+                </p:cond>
+              </p:nextCondLst>
+            </p:seq>
+          </p:childTnLst>
+        </p:cTn>
+      </p:par>
+    </p:tnLst>
+  </p:timing>
+</p:sld>
+</file>
+
+<file path=ppt/slides/slide7.xml><?xml version="1.0" encoding="utf-8"?>
+<p:sld xmlns:a="http://schemas.openxmlformats.org/drawingml/2006/main" xmlns:r="http://schemas.openxmlformats.org/officeDocument/2006/relationships" xmlns:p="http://schemas.openxmlformats.org/presentationml/2006/main">
+  <p:cSld>
+    <p:spTree>
+      <p:nvGrpSpPr>
+        <p:cNvPr id="1" name=""/>
+        <p:cNvGrpSpPr/>
+        <p:nvPr/>
+      </p:nvGrpSpPr>
+      <p:grpSpPr>
+        <a:xfrm>
+          <a:off x="0" y="0"/>
+          <a:ext cx="0" cy="0"/>
+          <a:chOff x="0" y="0"/>
+          <a:chExt cx="0" cy="0"/>
+        </a:xfrm>
+      </p:grpSpPr>
       <p:pic>
         <p:nvPicPr>
           <p:cNvPr id="4" name="Content Placeholder 3"/>
@@ -5018,7 +6046,7 @@
 </p:sld>
 </file>
 
-<file path=ppt/slides/slide7.xml><?xml version="1.0" encoding="utf-8"?>
+<file path=ppt/slides/slide8.xml><?xml version="1.0" encoding="utf-8"?>
 <p:sld xmlns:a="http://schemas.openxmlformats.org/drawingml/2006/main" xmlns:r="http://schemas.openxmlformats.org/officeDocument/2006/relationships" xmlns:p="http://schemas.openxmlformats.org/presentationml/2006/main">
   <p:cSld>
     <p:spTree>
@@ -5387,7 +6415,7 @@
 </p:sld>
 </file>
 
-<file path=ppt/slides/slide8.xml><?xml version="1.0" encoding="utf-8"?>
+<file path=ppt/slides/slide9.xml><?xml version="1.0" encoding="utf-8"?>
 <p:sld xmlns:a="http://schemas.openxmlformats.org/drawingml/2006/main" xmlns:r="http://schemas.openxmlformats.org/officeDocument/2006/relationships" xmlns:p="http://schemas.openxmlformats.org/presentationml/2006/main">
   <p:cSld>
     <p:spTree>
@@ -5460,112 +6488,6 @@
     <p:extLst>
       <p:ext uri="{BB962C8B-B14F-4D97-AF65-F5344CB8AC3E}">
         <p14:creationId xmlns:p14="http://schemas.microsoft.com/office/powerpoint/2010/main" val="1776174767"/>
-      </p:ext>
-    </p:extLst>
-  </p:cSld>
-  <p:clrMapOvr>
-    <a:masterClrMapping/>
-  </p:clrMapOvr>
-  <p:timing>
-    <p:tnLst>
-      <p:par>
-        <p:cTn id="1" dur="indefinite" restart="never" nodeType="tmRoot"/>
-      </p:par>
-    </p:tnLst>
-  </p:timing>
-</p:sld>
-</file>
-
-<file path=ppt/slides/slide9.xml><?xml version="1.0" encoding="utf-8"?>
-<p:sld xmlns:a="http://schemas.openxmlformats.org/drawingml/2006/main" xmlns:r="http://schemas.openxmlformats.org/officeDocument/2006/relationships" xmlns:p="http://schemas.openxmlformats.org/presentationml/2006/main">
-  <p:cSld>
-    <p:spTree>
-      <p:nvGrpSpPr>
-        <p:cNvPr id="1" name=""/>
-        <p:cNvGrpSpPr/>
-        <p:nvPr/>
-      </p:nvGrpSpPr>
-      <p:grpSpPr>
-        <a:xfrm>
-          <a:off x="0" y="0"/>
-          <a:ext cx="0" cy="0"/>
-          <a:chOff x="0" y="0"/>
-          <a:chExt cx="0" cy="0"/>
-        </a:xfrm>
-      </p:grpSpPr>
-      <p:sp>
-        <p:nvSpPr>
-          <p:cNvPr id="4" name="Rectangle 3"/>
-          <p:cNvSpPr/>
-          <p:nvPr/>
-        </p:nvSpPr>
-        <p:spPr>
-          <a:xfrm>
-            <a:off x="3372424" y="838200"/>
-            <a:ext cx="2350323" cy="369332"/>
-          </a:xfrm>
-          <a:prstGeom prst="rect">
-            <a:avLst/>
-          </a:prstGeom>
-        </p:spPr>
-        <p:txBody>
-          <a:bodyPr wrap="none">
-            <a:spAutoFit/>
-          </a:bodyPr>
-          <a:lstStyle/>
-          <a:p>
-            <a:r>
-              <a:rPr lang="en-US" dirty="0"/>
-              <a:t>Refactor with respect</a:t>
-            </a:r>
-          </a:p>
-        </p:txBody>
-      </p:sp>
-      <p:pic>
-        <p:nvPicPr>
-          <p:cNvPr id="5122" name="Picture 2" descr="https://encrypted-tbn0.gstatic.com/images?q=tbn:ANd9GcQBimM8hQVe9QrZBuGyMOIzujUOZbTVyDFwASlm16FudOfiQ4g7SA"/>
-          <p:cNvPicPr>
-            <a:picLocks noChangeAspect="1" noChangeArrowheads="1"/>
-          </p:cNvPicPr>
-          <p:nvPr/>
-        </p:nvPicPr>
-        <p:blipFill>
-          <a:blip r:embed="rId2">
-            <a:extLst>
-              <a:ext uri="{28A0092B-C50C-407E-A947-70E740481C1C}">
-                <a14:useLocalDpi xmlns:a14="http://schemas.microsoft.com/office/drawing/2010/main" val="0"/>
-              </a:ext>
-            </a:extLst>
-          </a:blip>
-          <a:srcRect/>
-          <a:stretch>
-            <a:fillRect/>
-          </a:stretch>
-        </p:blipFill>
-        <p:spPr bwMode="auto">
-          <a:xfrm>
-            <a:off x="3048000" y="1752600"/>
-            <a:ext cx="3173603" cy="2980429"/>
-          </a:xfrm>
-          <a:prstGeom prst="rect">
-            <a:avLst/>
-          </a:prstGeom>
-          <a:noFill/>
-          <a:extLst>
-            <a:ext uri="{909E8E84-426E-40DD-AFC4-6F175D3DCCD1}">
-              <a14:hiddenFill xmlns:a14="http://schemas.microsoft.com/office/drawing/2010/main">
-                <a:solidFill>
-                  <a:srgbClr val="FFFFFF"/>
-                </a:solidFill>
-              </a14:hiddenFill>
-            </a:ext>
-          </a:extLst>
-        </p:spPr>
-      </p:pic>
-    </p:spTree>
-    <p:extLst>
-      <p:ext uri="{BB962C8B-B14F-4D97-AF65-F5344CB8AC3E}">
-        <p14:creationId xmlns:p14="http://schemas.microsoft.com/office/powerpoint/2010/main" val="901413111"/>
       </p:ext>
     </p:extLst>
   </p:cSld>

</xml_diff>